<commit_message>
Finished Powerpoint (please review)
I've gone through the assignment requirements and added all of the
things that must be on the presentation. Please take a look and let me
know if there are questions.
</commit_message>
<xml_diff>
--- a/Codename flaming zebras.pptx
+++ b/Codename flaming zebras.pptx
@@ -7,8 +7,12 @@
   <p:sldIdLst>
     <p:sldId id="256" r:id="rId2"/>
     <p:sldId id="257" r:id="rId3"/>
-    <p:sldId id="258" r:id="rId4"/>
-    <p:sldId id="259" r:id="rId5"/>
+    <p:sldId id="260" r:id="rId4"/>
+    <p:sldId id="262" r:id="rId5"/>
+    <p:sldId id="261" r:id="rId6"/>
+    <p:sldId id="258" r:id="rId7"/>
+    <p:sldId id="263" r:id="rId8"/>
+    <p:sldId id="264" r:id="rId9"/>
   </p:sldIdLst>
   <p:sldSz cx="9144000" cy="6858000" type="screen4x3"/>
   <p:notesSz cx="6858000" cy="9144000"/>
@@ -291,7 +295,7 @@
           <a:p>
             <a:fld id="{D1397DF7-0E17-48A2-B10A-BF75F6C7B3BE}" type="datetimeFigureOut">
               <a:rPr lang="en-CA" smtClean="0"/>
-              <a:t>2014-09-09</a:t>
+              <a:t>11/09/2014</a:t>
             </a:fld>
             <a:endParaRPr lang="en-CA"/>
           </a:p>
@@ -461,7 +465,7 @@
           <a:p>
             <a:fld id="{D1397DF7-0E17-48A2-B10A-BF75F6C7B3BE}" type="datetimeFigureOut">
               <a:rPr lang="en-CA" smtClean="0"/>
-              <a:t>2014-09-09</a:t>
+              <a:t>11/09/2014</a:t>
             </a:fld>
             <a:endParaRPr lang="en-CA"/>
           </a:p>
@@ -641,7 +645,7 @@
           <a:p>
             <a:fld id="{D1397DF7-0E17-48A2-B10A-BF75F6C7B3BE}" type="datetimeFigureOut">
               <a:rPr lang="en-CA" smtClean="0"/>
-              <a:t>2014-09-09</a:t>
+              <a:t>11/09/2014</a:t>
             </a:fld>
             <a:endParaRPr lang="en-CA"/>
           </a:p>
@@ -811,7 +815,7 @@
           <a:p>
             <a:fld id="{D1397DF7-0E17-48A2-B10A-BF75F6C7B3BE}" type="datetimeFigureOut">
               <a:rPr lang="en-CA" smtClean="0"/>
-              <a:t>2014-09-09</a:t>
+              <a:t>11/09/2014</a:t>
             </a:fld>
             <a:endParaRPr lang="en-CA"/>
           </a:p>
@@ -1057,7 +1061,7 @@
           <a:p>
             <a:fld id="{D1397DF7-0E17-48A2-B10A-BF75F6C7B3BE}" type="datetimeFigureOut">
               <a:rPr lang="en-CA" smtClean="0"/>
-              <a:t>2014-09-09</a:t>
+              <a:t>11/09/2014</a:t>
             </a:fld>
             <a:endParaRPr lang="en-CA"/>
           </a:p>
@@ -1345,7 +1349,7 @@
           <a:p>
             <a:fld id="{D1397DF7-0E17-48A2-B10A-BF75F6C7B3BE}" type="datetimeFigureOut">
               <a:rPr lang="en-CA" smtClean="0"/>
-              <a:t>2014-09-09</a:t>
+              <a:t>11/09/2014</a:t>
             </a:fld>
             <a:endParaRPr lang="en-CA"/>
           </a:p>
@@ -1767,7 +1771,7 @@
           <a:p>
             <a:fld id="{D1397DF7-0E17-48A2-B10A-BF75F6C7B3BE}" type="datetimeFigureOut">
               <a:rPr lang="en-CA" smtClean="0"/>
-              <a:t>2014-09-09</a:t>
+              <a:t>11/09/2014</a:t>
             </a:fld>
             <a:endParaRPr lang="en-CA"/>
           </a:p>
@@ -1885,7 +1889,7 @@
           <a:p>
             <a:fld id="{D1397DF7-0E17-48A2-B10A-BF75F6C7B3BE}" type="datetimeFigureOut">
               <a:rPr lang="en-CA" smtClean="0"/>
-              <a:t>2014-09-09</a:t>
+              <a:t>11/09/2014</a:t>
             </a:fld>
             <a:endParaRPr lang="en-CA"/>
           </a:p>
@@ -1980,7 +1984,7 @@
           <a:p>
             <a:fld id="{D1397DF7-0E17-48A2-B10A-BF75F6C7B3BE}" type="datetimeFigureOut">
               <a:rPr lang="en-CA" smtClean="0"/>
-              <a:t>2014-09-09</a:t>
+              <a:t>11/09/2014</a:t>
             </a:fld>
             <a:endParaRPr lang="en-CA"/>
           </a:p>
@@ -2257,7 +2261,7 @@
           <a:p>
             <a:fld id="{D1397DF7-0E17-48A2-B10A-BF75F6C7B3BE}" type="datetimeFigureOut">
               <a:rPr lang="en-CA" smtClean="0"/>
-              <a:t>2014-09-09</a:t>
+              <a:t>11/09/2014</a:t>
             </a:fld>
             <a:endParaRPr lang="en-CA"/>
           </a:p>
@@ -2510,7 +2514,7 @@
           <a:p>
             <a:fld id="{D1397DF7-0E17-48A2-B10A-BF75F6C7B3BE}" type="datetimeFigureOut">
               <a:rPr lang="en-CA" smtClean="0"/>
-              <a:t>2014-09-09</a:t>
+              <a:t>11/09/2014</a:t>
             </a:fld>
             <a:endParaRPr lang="en-CA"/>
           </a:p>
@@ -2723,7 +2727,7 @@
           <a:p>
             <a:fld id="{D1397DF7-0E17-48A2-B10A-BF75F6C7B3BE}" type="datetimeFigureOut">
               <a:rPr lang="en-CA" smtClean="0"/>
-              <a:t>2014-09-09</a:t>
+              <a:t>11/09/2014</a:t>
             </a:fld>
             <a:endParaRPr lang="en-CA"/>
           </a:p>
@@ -3281,7 +3285,15 @@
           <a:p>
             <a:r>
               <a:rPr lang="en-US" dirty="0" smtClean="0"/>
-              <a:t>Brave adventurers enter a strange temple looking for treasure.</a:t>
+              <a:t>Brave adventurers enter a strange temple </a:t>
+            </a:r>
+            <a:r>
+              <a:rPr lang="en-US" dirty="0" smtClean="0"/>
+              <a:t>seeking </a:t>
+            </a:r>
+            <a:r>
+              <a:rPr lang="en-US" dirty="0" smtClean="0"/>
+              <a:t>treasure.</a:t>
             </a:r>
           </a:p>
           <a:p>
@@ -3293,7 +3305,15 @@
           <a:p>
             <a:r>
               <a:rPr lang="en-US" dirty="0" smtClean="0"/>
-              <a:t>The strange power of the temple resurrects them to fight each other again and again…   for all time.</a:t>
+              <a:t>The strange power of the temple </a:t>
+            </a:r>
+            <a:r>
+              <a:rPr lang="en-US" dirty="0" smtClean="0"/>
+              <a:t>resurrect </a:t>
+            </a:r>
+            <a:r>
+              <a:rPr lang="en-US" dirty="0" smtClean="0"/>
+              <a:t>them to fight each other again and again…   for all time.</a:t>
             </a:r>
             <a:endParaRPr lang="en-CA" dirty="0"/>
           </a:p>
@@ -3341,14 +3361,16 @@
         </p:nvSpPr>
         <p:spPr/>
         <p:txBody>
-          <a:bodyPr/>
+          <a:bodyPr>
+            <a:normAutofit/>
+          </a:bodyPr>
           <a:lstStyle/>
           <a:p>
             <a:r>
               <a:rPr lang="en-US" sz="6700" dirty="0" smtClean="0"/>
-              <a:t>Features</a:t>
-            </a:r>
-            <a:endParaRPr lang="en-CA" sz="6700" dirty="0"/>
+              <a:t>Marketing</a:t>
+            </a:r>
+            <a:endParaRPr lang="en-US" sz="6700" dirty="0"/>
           </a:p>
         </p:txBody>
       </p:sp>
@@ -3362,39 +3384,79 @@
             <p:ph idx="1"/>
           </p:nvPr>
         </p:nvSpPr>
-        <p:spPr/>
-        <p:txBody>
-          <a:bodyPr/>
+        <p:spPr>
+          <a:xfrm>
+            <a:off x="457200" y="1600200"/>
+            <a:ext cx="8229600" cy="4724400"/>
+          </a:xfrm>
+        </p:spPr>
+        <p:txBody>
+          <a:bodyPr>
+            <a:normAutofit/>
+          </a:bodyPr>
           <a:lstStyle/>
           <a:p>
             <a:r>
               <a:rPr lang="en-US" dirty="0" smtClean="0"/>
-              <a:t>4-Player split screen free-for-all arena</a:t>
-            </a:r>
-          </a:p>
-          <a:p>
+              <a:t>Target Market:</a:t>
+            </a:r>
+          </a:p>
+          <a:p>
+            <a:pPr lvl="1"/>
             <a:r>
               <a:rPr lang="en-US" dirty="0" smtClean="0"/>
-              <a:t>Procedurally generated </a:t>
+              <a:t>“Core” gamers with a desire for competition within a friend-group scenario.</a:t>
+            </a:r>
+          </a:p>
+          <a:p>
+            <a:pPr lvl="1"/>
+            <a:r>
+              <a:rPr lang="en-US" dirty="0" smtClean="0"/>
+              <a:t>PC initially (console later possibility)</a:t>
+            </a:r>
+          </a:p>
+          <a:p>
+            <a:pPr lvl="1"/>
+            <a:r>
+              <a:rPr lang="en-US" dirty="0" smtClean="0"/>
+              <a:t>Couch + Controller </a:t>
             </a:r>
             <a:r>
               <a:rPr lang="en-US" dirty="0" err="1" smtClean="0"/>
-              <a:t>platforming</a:t>
+              <a:t>playstyle</a:t>
             </a:r>
             <a:r>
               <a:rPr lang="en-US" dirty="0" smtClean="0"/>
-              <a:t> stages</a:t>
-            </a:r>
-          </a:p>
-          <a:p>
-            <a:endParaRPr lang="en-CA" dirty="0"/>
+              <a:t> (keyboard supported)</a:t>
+            </a:r>
+          </a:p>
+          <a:p>
+            <a:r>
+              <a:rPr lang="en-US" dirty="0" smtClean="0"/>
+              <a:t>This is the sort of “Casual”-Hardcore game that might be associated with games like </a:t>
+            </a:r>
+            <a:r>
+              <a:rPr lang="en-US" dirty="0" err="1" smtClean="0"/>
+              <a:t>Spelunky</a:t>
+            </a:r>
+            <a:r>
+              <a:rPr lang="en-US" dirty="0" smtClean="0"/>
+              <a:t> or Samurai Gunn</a:t>
+            </a:r>
+          </a:p>
+          <a:p>
+            <a:pPr lvl="1"/>
+            <a:r>
+              <a:rPr lang="en-US" dirty="0" smtClean="0"/>
+              <a:t>Easy to pick up, hard to master</a:t>
+            </a:r>
           </a:p>
         </p:txBody>
       </p:sp>
     </p:spTree>
     <p:extLst>
       <p:ext uri="{BB962C8B-B14F-4D97-AF65-F5344CB8AC3E}">
-        <p14:creationId xmlns:p14="http://schemas.microsoft.com/office/powerpoint/2010/main" val="4029274451"/>
+        <p14:creationId xmlns:p14="http://schemas.microsoft.com/office/powerpoint/2010/main" val="1773491643"/>
       </p:ext>
     </p:extLst>
   </p:cSld>
@@ -3440,9 +3502,9 @@
           <a:p>
             <a:r>
               <a:rPr lang="en-US" sz="6700" dirty="0" smtClean="0"/>
-              <a:t>Core Gameplay</a:t>
-            </a:r>
-            <a:endParaRPr lang="en-CA" sz="6700" dirty="0"/>
+              <a:t>Resources: Code</a:t>
+            </a:r>
+            <a:endParaRPr lang="en-US" sz="6700" dirty="0"/>
           </a:p>
         </p:txBody>
       </p:sp>
@@ -3456,51 +3518,601 @@
             <p:ph idx="1"/>
           </p:nvPr>
         </p:nvSpPr>
-        <p:spPr/>
-        <p:txBody>
-          <a:bodyPr/>
-          <a:lstStyle/>
-          <a:p>
-            <a:r>
-              <a:rPr lang="en-US" dirty="0" smtClean="0"/>
-              <a:t>4 zones on the map, with an additional shop for purchasing upgrades</a:t>
-            </a:r>
-          </a:p>
-          <a:p>
-            <a:r>
-              <a:rPr lang="en-US" dirty="0" smtClean="0"/>
-              <a:t>Money is the measure of success (points)</a:t>
-            </a:r>
-          </a:p>
-          <a:p>
-            <a:r>
-              <a:rPr lang="en-US" dirty="0" smtClean="0"/>
-              <a:t>You need to spend money to buy upgrades</a:t>
-            </a:r>
-          </a:p>
-          <a:p>
-            <a:r>
-              <a:rPr lang="en-US" dirty="0" smtClean="0"/>
-              <a:t>Zones possess various difficulty/reward ratios</a:t>
-            </a:r>
-          </a:p>
-          <a:p>
-            <a:r>
-              <a:rPr lang="en-US" dirty="0" smtClean="0"/>
-              <a:t>All players are forced to meet in the final minutes of the game to fight </a:t>
-            </a:r>
-            <a:r>
-              <a:rPr lang="en-US" smtClean="0"/>
-              <a:t>for supremacy.</a:t>
-            </a:r>
-            <a:endParaRPr lang="en-CA" dirty="0"/>
+        <p:spPr>
+          <a:xfrm>
+            <a:off x="228600" y="1371600"/>
+            <a:ext cx="8686800" cy="5257800"/>
+          </a:xfrm>
+        </p:spPr>
+        <p:txBody>
+          <a:bodyPr>
+            <a:normAutofit/>
+          </a:bodyPr>
+          <a:lstStyle/>
+          <a:p>
+            <a:r>
+              <a:rPr lang="en-US" sz="3000" dirty="0" smtClean="0"/>
+              <a:t>Procedural level layout code</a:t>
+            </a:r>
+          </a:p>
+          <a:p>
+            <a:r>
+              <a:rPr lang="en-US" sz="3000" dirty="0" smtClean="0"/>
+              <a:t>AI algorithms to challenge players of various skill levels (spread among </a:t>
+            </a:r>
+            <a:r>
+              <a:rPr lang="en-US" sz="3000" dirty="0" err="1" smtClean="0"/>
+              <a:t>tilesets</a:t>
+            </a:r>
+            <a:r>
+              <a:rPr lang="en-US" sz="3000" dirty="0" smtClean="0"/>
+              <a:t>)</a:t>
+            </a:r>
+          </a:p>
+          <a:p>
+            <a:r>
+              <a:rPr lang="en-US" sz="3000" dirty="0" smtClean="0"/>
+              <a:t>4 player </a:t>
+            </a:r>
+            <a:r>
+              <a:rPr lang="en-US" sz="3000" dirty="0" err="1" smtClean="0"/>
+              <a:t>splitscreen</a:t>
+            </a:r>
+            <a:r>
+              <a:rPr lang="en-US" sz="3000" dirty="0" smtClean="0"/>
+              <a:t> with individual player cameras</a:t>
+            </a:r>
+          </a:p>
+          <a:p>
+            <a:r>
+              <a:rPr lang="en-US" sz="3000" dirty="0" smtClean="0"/>
+              <a:t>Intelligent trap triggering code (avoidable but still surprising to the inattentive)</a:t>
+            </a:r>
+          </a:p>
+          <a:p>
+            <a:r>
+              <a:rPr lang="en-US" sz="3000" dirty="0" smtClean="0"/>
+              <a:t>Non-traditional movement physics (air-dashing)</a:t>
+            </a:r>
+          </a:p>
+          <a:p>
+            <a:r>
+              <a:rPr lang="en-US" sz="3000" dirty="0" smtClean="0"/>
+              <a:t>Modifiable and constantly changing player attributes including jump height and weapon style</a:t>
+            </a:r>
+          </a:p>
+          <a:p>
+            <a:r>
+              <a:rPr lang="en-US" sz="3000" dirty="0" smtClean="0"/>
+              <a:t>Estimated 80 – 100+ man-hours required</a:t>
+            </a:r>
+          </a:p>
+          <a:p>
+            <a:endParaRPr lang="en-US" sz="3000" dirty="0"/>
           </a:p>
         </p:txBody>
       </p:sp>
     </p:spTree>
     <p:extLst>
       <p:ext uri="{BB962C8B-B14F-4D97-AF65-F5344CB8AC3E}">
-        <p14:creationId xmlns:p14="http://schemas.microsoft.com/office/powerpoint/2010/main" val="4152681881"/>
+        <p14:creationId xmlns:p14="http://schemas.microsoft.com/office/powerpoint/2010/main" val="912551375"/>
+      </p:ext>
+    </p:extLst>
+  </p:cSld>
+  <p:clrMapOvr>
+    <a:masterClrMapping/>
+  </p:clrMapOvr>
+</p:sld>
+</file>
+
+<file path=ppt/slides/slide5.xml><?xml version="1.0" encoding="utf-8"?>
+<p:sld xmlns:a="http://schemas.openxmlformats.org/drawingml/2006/main" xmlns:r="http://schemas.openxmlformats.org/officeDocument/2006/relationships" xmlns:p="http://schemas.openxmlformats.org/presentationml/2006/main">
+  <p:cSld>
+    <p:spTree>
+      <p:nvGrpSpPr>
+        <p:cNvPr id="1" name=""/>
+        <p:cNvGrpSpPr/>
+        <p:nvPr/>
+      </p:nvGrpSpPr>
+      <p:grpSpPr>
+        <a:xfrm>
+          <a:off x="0" y="0"/>
+          <a:ext cx="0" cy="0"/>
+          <a:chOff x="0" y="0"/>
+          <a:chExt cx="0" cy="0"/>
+        </a:xfrm>
+      </p:grpSpPr>
+      <p:sp>
+        <p:nvSpPr>
+          <p:cNvPr id="2" name="Title 1"/>
+          <p:cNvSpPr>
+            <a:spLocks noGrp="1"/>
+          </p:cNvSpPr>
+          <p:nvPr>
+            <p:ph type="title"/>
+          </p:nvPr>
+        </p:nvSpPr>
+        <p:spPr/>
+        <p:txBody>
+          <a:bodyPr>
+            <a:normAutofit/>
+          </a:bodyPr>
+          <a:lstStyle/>
+          <a:p>
+            <a:r>
+              <a:rPr lang="en-US" sz="6700" dirty="0" smtClean="0"/>
+              <a:t>Resources: Art</a:t>
+            </a:r>
+            <a:endParaRPr lang="en-US" sz="6700" dirty="0"/>
+          </a:p>
+        </p:txBody>
+      </p:sp>
+      <p:sp>
+        <p:nvSpPr>
+          <p:cNvPr id="3" name="Content Placeholder 2"/>
+          <p:cNvSpPr>
+            <a:spLocks noGrp="1"/>
+          </p:cNvSpPr>
+          <p:nvPr>
+            <p:ph idx="1"/>
+          </p:nvPr>
+        </p:nvSpPr>
+        <p:spPr>
+          <a:xfrm>
+            <a:off x="228600" y="1600200"/>
+            <a:ext cx="8686800" cy="4953000"/>
+          </a:xfrm>
+        </p:spPr>
+        <p:txBody>
+          <a:bodyPr>
+            <a:normAutofit/>
+          </a:bodyPr>
+          <a:lstStyle/>
+          <a:p>
+            <a:r>
+              <a:rPr lang="en-US" sz="3000" dirty="0" smtClean="0"/>
+              <a:t>Four individually distinguishable player sprites + animation sets</a:t>
+            </a:r>
+          </a:p>
+          <a:p>
+            <a:r>
+              <a:rPr lang="en-US" sz="3000" dirty="0" smtClean="0"/>
+              <a:t>More than 20 enemy sprites + attack animations</a:t>
+            </a:r>
+          </a:p>
+          <a:p>
+            <a:r>
+              <a:rPr lang="en-US" sz="3000" dirty="0" smtClean="0"/>
+              <a:t>3-4 </a:t>
+            </a:r>
+            <a:r>
+              <a:rPr lang="en-US" sz="3000" dirty="0" err="1" smtClean="0"/>
+              <a:t>tilesets</a:t>
+            </a:r>
+            <a:r>
+              <a:rPr lang="en-US" sz="3000" dirty="0" smtClean="0"/>
+              <a:t> for various levels (+ shop stalls etc.)</a:t>
+            </a:r>
+          </a:p>
+          <a:p>
+            <a:r>
+              <a:rPr lang="en-US" sz="3000" dirty="0" smtClean="0"/>
+              <a:t>Projectile sprites for each of 4 weapons over 3 levels</a:t>
+            </a:r>
+          </a:p>
+          <a:p>
+            <a:r>
+              <a:rPr lang="en-US" sz="3000" dirty="0" smtClean="0"/>
+              <a:t>Estimated 120 or fewer man-hours depending on fidelity</a:t>
+            </a:r>
+          </a:p>
+        </p:txBody>
+      </p:sp>
+    </p:spTree>
+    <p:extLst>
+      <p:ext uri="{BB962C8B-B14F-4D97-AF65-F5344CB8AC3E}">
+        <p14:creationId xmlns:p14="http://schemas.microsoft.com/office/powerpoint/2010/main" val="1838947852"/>
+      </p:ext>
+    </p:extLst>
+  </p:cSld>
+  <p:clrMapOvr>
+    <a:masterClrMapping/>
+  </p:clrMapOvr>
+</p:sld>
+</file>
+
+<file path=ppt/slides/slide6.xml><?xml version="1.0" encoding="utf-8"?>
+<p:sld xmlns:a="http://schemas.openxmlformats.org/drawingml/2006/main" xmlns:r="http://schemas.openxmlformats.org/officeDocument/2006/relationships" xmlns:p="http://schemas.openxmlformats.org/presentationml/2006/main">
+  <p:cSld>
+    <p:spTree>
+      <p:nvGrpSpPr>
+        <p:cNvPr id="1" name=""/>
+        <p:cNvGrpSpPr/>
+        <p:nvPr/>
+      </p:nvGrpSpPr>
+      <p:grpSpPr>
+        <a:xfrm>
+          <a:off x="0" y="0"/>
+          <a:ext cx="0" cy="0"/>
+          <a:chOff x="0" y="0"/>
+          <a:chExt cx="0" cy="0"/>
+        </a:xfrm>
+      </p:grpSpPr>
+      <p:sp>
+        <p:nvSpPr>
+          <p:cNvPr id="2" name="Title 1"/>
+          <p:cNvSpPr>
+            <a:spLocks noGrp="1"/>
+          </p:cNvSpPr>
+          <p:nvPr>
+            <p:ph type="title"/>
+          </p:nvPr>
+        </p:nvSpPr>
+        <p:spPr/>
+        <p:txBody>
+          <a:bodyPr/>
+          <a:lstStyle/>
+          <a:p>
+            <a:r>
+              <a:rPr lang="en-US" sz="6700" dirty="0" smtClean="0"/>
+              <a:t>Features</a:t>
+            </a:r>
+            <a:endParaRPr lang="en-CA" sz="6700" dirty="0"/>
+          </a:p>
+        </p:txBody>
+      </p:sp>
+      <p:sp>
+        <p:nvSpPr>
+          <p:cNvPr id="3" name="Content Placeholder 2"/>
+          <p:cNvSpPr>
+            <a:spLocks noGrp="1"/>
+          </p:cNvSpPr>
+          <p:nvPr>
+            <p:ph idx="1"/>
+          </p:nvPr>
+        </p:nvSpPr>
+        <p:spPr>
+          <a:xfrm>
+            <a:off x="457200" y="1447800"/>
+            <a:ext cx="8229600" cy="5257800"/>
+          </a:xfrm>
+        </p:spPr>
+        <p:txBody>
+          <a:bodyPr>
+            <a:normAutofit fontScale="92500" lnSpcReduction="10000"/>
+          </a:bodyPr>
+          <a:lstStyle/>
+          <a:p>
+            <a:r>
+              <a:rPr lang="en-US" dirty="0" smtClean="0"/>
+              <a:t>4-Player split screen free-for-all arena</a:t>
+            </a:r>
+          </a:p>
+          <a:p>
+            <a:r>
+              <a:rPr lang="en-US" dirty="0" smtClean="0"/>
+              <a:t>Procedurally generated </a:t>
+            </a:r>
+            <a:r>
+              <a:rPr lang="en-US" dirty="0" err="1" smtClean="0"/>
+              <a:t>platforming</a:t>
+            </a:r>
+            <a:r>
+              <a:rPr lang="en-US" dirty="0" smtClean="0"/>
+              <a:t> </a:t>
+            </a:r>
+            <a:r>
+              <a:rPr lang="en-US" dirty="0" smtClean="0"/>
+              <a:t>stages</a:t>
+            </a:r>
+          </a:p>
+          <a:p>
+            <a:r>
+              <a:rPr lang="en-US" dirty="0" smtClean="0"/>
+              <a:t>AI enemies guarding hoards of gold</a:t>
+            </a:r>
+          </a:p>
+          <a:p>
+            <a:r>
+              <a:rPr lang="en-US" dirty="0" smtClean="0"/>
+              <a:t>Multiple weapons with various counter-play opportunities</a:t>
+            </a:r>
+          </a:p>
+          <a:p>
+            <a:r>
+              <a:rPr lang="en-US" dirty="0" smtClean="0"/>
+              <a:t>Gold is both the shop currency, and the point system that wins the game. (value tradeoff)</a:t>
+            </a:r>
+            <a:endParaRPr lang="en-US" dirty="0" smtClean="0"/>
+          </a:p>
+          <a:p>
+            <a:r>
+              <a:rPr lang="en-US" dirty="0"/>
+              <a:t>Frenetic combat is </a:t>
+            </a:r>
+            <a:r>
+              <a:rPr lang="en-US" dirty="0" smtClean="0"/>
+              <a:t>interspersed </a:t>
+            </a:r>
+            <a:r>
+              <a:rPr lang="en-US" dirty="0"/>
+              <a:t>with tense </a:t>
+            </a:r>
+            <a:r>
+              <a:rPr lang="en-US" dirty="0" smtClean="0"/>
+              <a:t>buildup</a:t>
+            </a:r>
+            <a:r>
+              <a:rPr lang="en-CA" dirty="0"/>
+              <a:t> </a:t>
+            </a:r>
+            <a:r>
+              <a:rPr lang="en-CA" dirty="0" smtClean="0"/>
+              <a:t>as players clash for short periods throughout the game.</a:t>
+            </a:r>
+          </a:p>
+          <a:p>
+            <a:r>
+              <a:rPr lang="en-CA" dirty="0" smtClean="0"/>
+              <a:t>Final free-for-all slugfest to decide winner.</a:t>
+            </a:r>
+          </a:p>
+        </p:txBody>
+      </p:sp>
+    </p:spTree>
+    <p:extLst>
+      <p:ext uri="{BB962C8B-B14F-4D97-AF65-F5344CB8AC3E}">
+        <p14:creationId xmlns:p14="http://schemas.microsoft.com/office/powerpoint/2010/main" val="4029274451"/>
+      </p:ext>
+    </p:extLst>
+  </p:cSld>
+  <p:clrMapOvr>
+    <a:masterClrMapping/>
+  </p:clrMapOvr>
+</p:sld>
+</file>
+
+<file path=ppt/slides/slide7.xml><?xml version="1.0" encoding="utf-8"?>
+<p:sld xmlns:a="http://schemas.openxmlformats.org/drawingml/2006/main" xmlns:r="http://schemas.openxmlformats.org/officeDocument/2006/relationships" xmlns:p="http://schemas.openxmlformats.org/presentationml/2006/main">
+  <p:cSld>
+    <p:spTree>
+      <p:nvGrpSpPr>
+        <p:cNvPr id="1" name=""/>
+        <p:cNvGrpSpPr/>
+        <p:nvPr/>
+      </p:nvGrpSpPr>
+      <p:grpSpPr>
+        <a:xfrm>
+          <a:off x="0" y="0"/>
+          <a:ext cx="0" cy="0"/>
+          <a:chOff x="0" y="0"/>
+          <a:chExt cx="0" cy="0"/>
+        </a:xfrm>
+      </p:grpSpPr>
+      <p:sp>
+        <p:nvSpPr>
+          <p:cNvPr id="2" name="Title 1"/>
+          <p:cNvSpPr>
+            <a:spLocks noGrp="1"/>
+          </p:cNvSpPr>
+          <p:nvPr>
+            <p:ph type="title"/>
+          </p:nvPr>
+        </p:nvSpPr>
+        <p:spPr/>
+        <p:txBody>
+          <a:bodyPr/>
+          <a:lstStyle/>
+          <a:p>
+            <a:r>
+              <a:rPr lang="en-US" dirty="0" smtClean="0"/>
+              <a:t>Technical Elements</a:t>
+            </a:r>
+            <a:endParaRPr lang="en-US" dirty="0"/>
+          </a:p>
+        </p:txBody>
+      </p:sp>
+      <p:sp>
+        <p:nvSpPr>
+          <p:cNvPr id="3" name="Content Placeholder 2"/>
+          <p:cNvSpPr>
+            <a:spLocks noGrp="1"/>
+          </p:cNvSpPr>
+          <p:nvPr>
+            <p:ph idx="1"/>
+          </p:nvPr>
+        </p:nvSpPr>
+        <p:spPr>
+          <a:xfrm>
+            <a:off x="457200" y="1371600"/>
+            <a:ext cx="8229600" cy="5181600"/>
+          </a:xfrm>
+        </p:spPr>
+        <p:txBody>
+          <a:bodyPr>
+            <a:normAutofit/>
+          </a:bodyPr>
+          <a:lstStyle/>
+          <a:p>
+            <a:r>
+              <a:rPr lang="en-US" dirty="0" smtClean="0"/>
+              <a:t>Interesting monster AI behavior (no AI players)</a:t>
+            </a:r>
+          </a:p>
+          <a:p>
+            <a:r>
+              <a:rPr lang="en-US" dirty="0" smtClean="0"/>
+              <a:t>Player physics modified throughout play</a:t>
+            </a:r>
+          </a:p>
+          <a:p>
+            <a:r>
+              <a:rPr lang="en-US" dirty="0" smtClean="0"/>
+              <a:t>Procedural level generation</a:t>
+            </a:r>
+          </a:p>
+          <a:p>
+            <a:r>
+              <a:rPr lang="en-US" dirty="0" smtClean="0"/>
+              <a:t>In-game </a:t>
+            </a:r>
+            <a:r>
+              <a:rPr lang="en-US" dirty="0"/>
+              <a:t>d</a:t>
+            </a:r>
+            <a:r>
+              <a:rPr lang="en-US" dirty="0" smtClean="0"/>
+              <a:t>ynamic shop worked into play area</a:t>
+            </a:r>
+          </a:p>
+          <a:p>
+            <a:r>
+              <a:rPr lang="en-US" dirty="0" smtClean="0"/>
+              <a:t>4 player split-screen switching to single-screen for final battle (individual player cameras)</a:t>
+            </a:r>
+          </a:p>
+          <a:p>
+            <a:r>
+              <a:rPr lang="en-US" dirty="0" smtClean="0"/>
+              <a:t>4 different weapons with radically different behavior and logic, from lasers to smart-</a:t>
+            </a:r>
+            <a:r>
+              <a:rPr lang="en-US" dirty="0" err="1" smtClean="0"/>
+              <a:t>missles</a:t>
+            </a:r>
+            <a:endParaRPr lang="en-US" dirty="0"/>
+          </a:p>
+        </p:txBody>
+      </p:sp>
+    </p:spTree>
+    <p:extLst>
+      <p:ext uri="{BB962C8B-B14F-4D97-AF65-F5344CB8AC3E}">
+        <p14:creationId xmlns:p14="http://schemas.microsoft.com/office/powerpoint/2010/main" val="1993578377"/>
+      </p:ext>
+    </p:extLst>
+  </p:cSld>
+  <p:clrMapOvr>
+    <a:masterClrMapping/>
+  </p:clrMapOvr>
+</p:sld>
+</file>
+
+<file path=ppt/slides/slide8.xml><?xml version="1.0" encoding="utf-8"?>
+<p:sld xmlns:a="http://schemas.openxmlformats.org/drawingml/2006/main" xmlns:r="http://schemas.openxmlformats.org/officeDocument/2006/relationships" xmlns:p="http://schemas.openxmlformats.org/presentationml/2006/main">
+  <p:cSld>
+    <p:spTree>
+      <p:nvGrpSpPr>
+        <p:cNvPr id="1" name=""/>
+        <p:cNvGrpSpPr/>
+        <p:nvPr/>
+      </p:nvGrpSpPr>
+      <p:grpSpPr>
+        <a:xfrm>
+          <a:off x="0" y="0"/>
+          <a:ext cx="0" cy="0"/>
+          <a:chOff x="0" y="0"/>
+          <a:chExt cx="0" cy="0"/>
+        </a:xfrm>
+      </p:grpSpPr>
+      <p:sp>
+        <p:nvSpPr>
+          <p:cNvPr id="2" name="Title 1"/>
+          <p:cNvSpPr>
+            <a:spLocks noGrp="1"/>
+          </p:cNvSpPr>
+          <p:nvPr>
+            <p:ph type="title"/>
+          </p:nvPr>
+        </p:nvSpPr>
+        <p:spPr/>
+        <p:txBody>
+          <a:bodyPr/>
+          <a:lstStyle/>
+          <a:p>
+            <a:r>
+              <a:rPr lang="en-US" dirty="0" smtClean="0"/>
+              <a:t>Summary</a:t>
+            </a:r>
+            <a:endParaRPr lang="en-US" dirty="0"/>
+          </a:p>
+        </p:txBody>
+      </p:sp>
+      <p:sp>
+        <p:nvSpPr>
+          <p:cNvPr id="3" name="Content Placeholder 2"/>
+          <p:cNvSpPr>
+            <a:spLocks noGrp="1"/>
+          </p:cNvSpPr>
+          <p:nvPr>
+            <p:ph idx="1"/>
+          </p:nvPr>
+        </p:nvSpPr>
+        <p:spPr>
+          <a:xfrm>
+            <a:off x="381000" y="1600200"/>
+            <a:ext cx="8382000" cy="4525963"/>
+          </a:xfrm>
+        </p:spPr>
+        <p:txBody>
+          <a:bodyPr/>
+          <a:lstStyle/>
+          <a:p>
+            <a:r>
+              <a:rPr lang="en-US" dirty="0" smtClean="0"/>
+              <a:t>4-player arena with frantic </a:t>
+            </a:r>
+            <a:r>
+              <a:rPr lang="en-US" dirty="0" err="1" smtClean="0"/>
+              <a:t>PvP</a:t>
+            </a:r>
+            <a:r>
+              <a:rPr lang="en-US" dirty="0" smtClean="0"/>
+              <a:t> and </a:t>
+            </a:r>
+            <a:r>
+              <a:rPr lang="en-US" dirty="0" err="1" smtClean="0"/>
+              <a:t>PvE</a:t>
+            </a:r>
+            <a:r>
+              <a:rPr lang="en-US" dirty="0" smtClean="0"/>
+              <a:t> combat</a:t>
+            </a:r>
+          </a:p>
+          <a:p>
+            <a:r>
+              <a:rPr lang="en-US" dirty="0" smtClean="0"/>
+              <a:t>Interesting gold dynamic as currency/points</a:t>
+            </a:r>
+          </a:p>
+          <a:p>
+            <a:r>
+              <a:rPr lang="en-US" dirty="0" smtClean="0"/>
+              <a:t>Easy to pick up – hard to master philosophy</a:t>
+            </a:r>
+          </a:p>
+          <a:p>
+            <a:r>
+              <a:rPr lang="en-US" dirty="0" smtClean="0"/>
+              <a:t>Appeals to a large dynamic defined by one’s friend group, from casual to “Core”</a:t>
+            </a:r>
+          </a:p>
+          <a:p>
+            <a:r>
+              <a:rPr lang="en-US" dirty="0" smtClean="0"/>
+              <a:t>We are the dedicated team who is willing to pour our best effort and ideas into making this </a:t>
+            </a:r>
+            <a:r>
+              <a:rPr lang="en-US" smtClean="0"/>
+              <a:t>game truly shine.</a:t>
+            </a:r>
+            <a:endParaRPr lang="en-US" dirty="0"/>
+          </a:p>
+        </p:txBody>
+      </p:sp>
+    </p:spTree>
+    <p:extLst>
+      <p:ext uri="{BB962C8B-B14F-4D97-AF65-F5344CB8AC3E}">
+        <p14:creationId xmlns:p14="http://schemas.microsoft.com/office/powerpoint/2010/main" val="1605486671"/>
       </p:ext>
     </p:extLst>
   </p:cSld>

</xml_diff>